<commit_message>
Update 6. Normative Argumentation.pptx
</commit_message>
<xml_diff>
--- a/slides/6. Normative Argumentation.pptx
+++ b/slides/6. Normative Argumentation.pptx
@@ -224,7 +224,7 @@
           <a:p>
             <a:fld id="{C20D082D-BBCD-481C-A7DE-212F37A75249}" type="datetimeFigureOut">
               <a:rPr lang="en-US" smtClean="0"/>
-              <a:t>11/17/2021</a:t>
+              <a:t>11/19/2021</a:t>
             </a:fld>
             <a:endParaRPr lang="en-US"/>
           </a:p>
@@ -614,7 +614,7 @@
                 <a:latin typeface="Arial" pitchFamily="-106" charset="0"/>
               </a:rPr>
               <a:pPr/>
-              <a:t>16</a:t>
+              <a:t>15</a:t>
             </a:fld>
             <a:endParaRPr lang="de-DE">
               <a:latin typeface="Arial" pitchFamily="-106" charset="0"/>
@@ -832,7 +832,7 @@
     </p:spTree>
     <p:extLst>
       <p:ext uri="{BB962C8B-B14F-4D97-AF65-F5344CB8AC3E}">
-        <p14:creationId xmlns:p14="http://schemas.microsoft.com/office/powerpoint/2010/main" val="935803130"/>
+        <p14:creationId xmlns:p14="http://schemas.microsoft.com/office/powerpoint/2010/main" val="1609927241"/>
       </p:ext>
     </p:extLst>
   </p:cSld>
@@ -881,7 +881,7 @@
                 <a:latin typeface="Arial" pitchFamily="-106" charset="0"/>
               </a:rPr>
               <a:pPr/>
-              <a:t>17</a:t>
+              <a:t>16</a:t>
             </a:fld>
             <a:endParaRPr lang="de-DE">
               <a:latin typeface="Arial" pitchFamily="-106" charset="0"/>
@@ -1099,7 +1099,7 @@
     </p:spTree>
     <p:extLst>
       <p:ext uri="{BB962C8B-B14F-4D97-AF65-F5344CB8AC3E}">
-        <p14:creationId xmlns:p14="http://schemas.microsoft.com/office/powerpoint/2010/main" val="762295406"/>
+        <p14:creationId xmlns:p14="http://schemas.microsoft.com/office/powerpoint/2010/main" val="935803130"/>
       </p:ext>
     </p:extLst>
   </p:cSld>
@@ -1148,7 +1148,7 @@
                 <a:latin typeface="Arial" pitchFamily="-106" charset="0"/>
               </a:rPr>
               <a:pPr/>
-              <a:t>18</a:t>
+              <a:t>17</a:t>
             </a:fld>
             <a:endParaRPr lang="de-DE">
               <a:latin typeface="Arial" pitchFamily="-106" charset="0"/>
@@ -1366,7 +1366,7 @@
     </p:spTree>
     <p:extLst>
       <p:ext uri="{BB962C8B-B14F-4D97-AF65-F5344CB8AC3E}">
-        <p14:creationId xmlns:p14="http://schemas.microsoft.com/office/powerpoint/2010/main" val="957397409"/>
+        <p14:creationId xmlns:p14="http://schemas.microsoft.com/office/powerpoint/2010/main" val="762295406"/>
       </p:ext>
     </p:extLst>
   </p:cSld>
@@ -1415,7 +1415,7 @@
                 <a:latin typeface="Arial" pitchFamily="-106" charset="0"/>
               </a:rPr>
               <a:pPr/>
-              <a:t>19</a:t>
+              <a:t>18</a:t>
             </a:fld>
             <a:endParaRPr lang="de-DE">
               <a:latin typeface="Arial" pitchFamily="-106" charset="0"/>
@@ -1633,7 +1633,7 @@
     </p:spTree>
     <p:extLst>
       <p:ext uri="{BB962C8B-B14F-4D97-AF65-F5344CB8AC3E}">
-        <p14:creationId xmlns:p14="http://schemas.microsoft.com/office/powerpoint/2010/main" val="1143646880"/>
+        <p14:creationId xmlns:p14="http://schemas.microsoft.com/office/powerpoint/2010/main" val="957397409"/>
       </p:ext>
     </p:extLst>
   </p:cSld>
@@ -1682,7 +1682,7 @@
                 <a:latin typeface="Arial" pitchFamily="-106" charset="0"/>
               </a:rPr>
               <a:pPr/>
-              <a:t>20</a:t>
+              <a:t>19</a:t>
             </a:fld>
             <a:endParaRPr lang="de-DE">
               <a:latin typeface="Arial" pitchFamily="-106" charset="0"/>
@@ -1732,7 +1732,7 @@
                 <a:ea typeface="ＭＳ Ｐゴシック" pitchFamily="-112" charset="-128"/>
                 <a:cs typeface="ＭＳ Ｐゴシック" pitchFamily="-112" charset="-128"/>
               </a:rPr>
-              <a:t>[dePoel&amp;Royakkers2011] Chapter 6, 7?, 8, 10?</a:t>
+              <a:t>[dePoel&amp;Royakkers2011] Chapter 3, 4, 5</a:t>
             </a:r>
           </a:p>
           <a:p>
@@ -1746,12 +1746,10 @@
                 <a:ea typeface="ＭＳ Ｐゴシック" pitchFamily="-112" charset="-128"/>
                 <a:cs typeface="ＭＳ Ｐゴシック" pitchFamily="-112" charset="-128"/>
               </a:rPr>
-              <a:t> </a:t>
-            </a:r>
-          </a:p>
-          <a:p>
-            <a:r>
-              <a:rPr lang="en-GB" sz="1200" kern="1200" dirty="0">
+              <a:t>[Pereira&amp;Saptawijaya2016] p. 110 </a:t>
+            </a:r>
+            <a:r>
+              <a:rPr lang="en-GB" sz="1200" kern="1200" dirty="0" err="1">
                 <a:solidFill>
                   <a:schemeClr val="tx1"/>
                 </a:solidFill>
@@ -1760,10 +1758,8 @@
                 <a:ea typeface="ＭＳ Ｐゴシック" pitchFamily="-112" charset="-128"/>
                 <a:cs typeface="ＭＳ Ｐゴシック" pitchFamily="-112" charset="-128"/>
               </a:rPr>
-              <a:t>[Fleddermann2013] p. 67 line charting</a:t>
-            </a:r>
-          </a:p>
-          <a:p>
+              <a:t>trolly</a:t>
+            </a:r>
             <a:r>
               <a:rPr lang="en-GB" sz="1200" kern="1200" dirty="0">
                 <a:solidFill>
@@ -1774,19 +1770,8 @@
                 <a:ea typeface="ＭＳ Ｐゴシック" pitchFamily="-112" charset="-128"/>
                 <a:cs typeface="ＭＳ Ｐゴシック" pitchFamily="-112" charset="-128"/>
               </a:rPr>
-              <a:t>[Fleddermann2013] p. 70 flow charting</a:t>
-            </a:r>
-          </a:p>
-          <a:p>
-            <a:endParaRPr lang="en-GB" sz="1200" kern="1200" dirty="0">
-              <a:solidFill>
-                <a:schemeClr val="tx1"/>
-              </a:solidFill>
-              <a:effectLst/>
-              <a:latin typeface="Arial" pitchFamily="-112" charset="0"/>
-              <a:ea typeface="ＭＳ Ｐゴシック" pitchFamily="-112" charset="-128"/>
-              <a:cs typeface="ＭＳ Ｐゴシック" pitchFamily="-112" charset="-128"/>
-            </a:endParaRPr>
+              <a:t> problem in different forms? Use to explain differences?</a:t>
+            </a:r>
           </a:p>
           <a:p>
             <a:r>
@@ -1799,7 +1784,7 @@
                 <a:ea typeface="ＭＳ Ｐゴシック" pitchFamily="-112" charset="-128"/>
                 <a:cs typeface="ＭＳ Ｐゴシック" pitchFamily="-112" charset="-128"/>
               </a:rPr>
-              <a:t>Trump = </a:t>
+              <a:t>[Pereira&amp;Saptawijaya2016] p. 20 double and triple effect &amp;  </a:t>
             </a:r>
             <a:r>
               <a:rPr lang="en-GB" sz="1200" kern="1200" dirty="0" err="1">
@@ -1811,17 +1796,96 @@
                 <a:ea typeface="ＭＳ Ｐゴシック" pitchFamily="-112" charset="-128"/>
                 <a:cs typeface="ＭＳ Ｐゴシック" pitchFamily="-112" charset="-128"/>
               </a:rPr>
-              <a:t>übertrumpfen</a:t>
-            </a:r>
-            <a:endParaRPr lang="en-GB" sz="1200" kern="1200" dirty="0">
-              <a:solidFill>
-                <a:schemeClr val="tx1"/>
-              </a:solidFill>
-              <a:effectLst/>
-              <a:latin typeface="Arial" pitchFamily="-112" charset="0"/>
-              <a:ea typeface="ＭＳ Ｐゴシック" pitchFamily="-112" charset="-128"/>
-              <a:cs typeface="ＭＳ Ｐゴシック" pitchFamily="-112" charset="-128"/>
-            </a:endParaRPr>
+              <a:t>trolly</a:t>
+            </a:r>
+            <a:r>
+              <a:rPr lang="en-GB" sz="1200" kern="1200" dirty="0">
+                <a:solidFill>
+                  <a:schemeClr val="tx1"/>
+                </a:solidFill>
+                <a:effectLst/>
+                <a:latin typeface="Arial" pitchFamily="-112" charset="0"/>
+                <a:ea typeface="ＭＳ Ｐゴシック" pitchFamily="-112" charset="-128"/>
+                <a:cs typeface="ＭＳ Ｐゴシック" pitchFamily="-112" charset="-128"/>
+              </a:rPr>
+              <a:t> problem </a:t>
+            </a:r>
+          </a:p>
+          <a:p>
+            <a:r>
+              <a:rPr lang="en-GB" sz="1200" kern="1200" dirty="0">
+                <a:solidFill>
+                  <a:schemeClr val="tx1"/>
+                </a:solidFill>
+                <a:effectLst/>
+                <a:latin typeface="Arial" pitchFamily="-112" charset="0"/>
+                <a:ea typeface="ＭＳ Ｐゴシック" pitchFamily="-112" charset="-128"/>
+                <a:cs typeface="ＭＳ Ｐゴシック" pitchFamily="-112" charset="-128"/>
+              </a:rPr>
+              <a:t> [Kizza2013] Chapter 3 Ethics </a:t>
+            </a:r>
+            <a:r>
+              <a:rPr lang="en-GB" sz="1200" kern="1200" dirty="0" err="1">
+                <a:solidFill>
+                  <a:schemeClr val="tx1"/>
+                </a:solidFill>
+                <a:effectLst/>
+                <a:latin typeface="Arial" pitchFamily="-112" charset="0"/>
+                <a:ea typeface="ＭＳ Ｐゴシック" pitchFamily="-112" charset="-128"/>
+                <a:cs typeface="ＭＳ Ｐゴシック" pitchFamily="-112" charset="-128"/>
+              </a:rPr>
+              <a:t>abd</a:t>
+            </a:r>
+            <a:r>
+              <a:rPr lang="en-GB" sz="1200" kern="1200" dirty="0">
+                <a:solidFill>
+                  <a:schemeClr val="tx1"/>
+                </a:solidFill>
+                <a:effectLst/>
+                <a:latin typeface="Arial" pitchFamily="-112" charset="0"/>
+                <a:ea typeface="ＭＳ Ｐゴシック" pitchFamily="-112" charset="-128"/>
+                <a:cs typeface="ＭＳ Ｐゴシック" pitchFamily="-112" charset="-128"/>
+              </a:rPr>
+              <a:t> </a:t>
+            </a:r>
+            <a:r>
+              <a:rPr lang="en-GB" sz="1200" kern="1200" dirty="0" err="1">
+                <a:solidFill>
+                  <a:schemeClr val="tx1"/>
+                </a:solidFill>
+                <a:effectLst/>
+                <a:latin typeface="Arial" pitchFamily="-112" charset="0"/>
+                <a:ea typeface="ＭＳ Ｐゴシック" pitchFamily="-112" charset="-128"/>
+                <a:cs typeface="ＭＳ Ｐゴシック" pitchFamily="-112" charset="-128"/>
+              </a:rPr>
+              <a:t>Ethecial</a:t>
+            </a:r>
+            <a:r>
+              <a:rPr lang="en-GB" sz="1200" kern="1200" dirty="0">
+                <a:solidFill>
+                  <a:schemeClr val="tx1"/>
+                </a:solidFill>
+                <a:effectLst/>
+                <a:latin typeface="Arial" pitchFamily="-112" charset="0"/>
+                <a:ea typeface="ＭＳ Ｐゴシック" pitchFamily="-112" charset="-128"/>
+                <a:cs typeface="ＭＳ Ｐゴシック" pitchFamily="-112" charset="-128"/>
+              </a:rPr>
+              <a:t> Analysis</a:t>
+            </a:r>
+          </a:p>
+          <a:p>
+            <a:r>
+              <a:rPr lang="en-GB" sz="1200" kern="1200" dirty="0">
+                <a:solidFill>
+                  <a:schemeClr val="tx1"/>
+                </a:solidFill>
+                <a:effectLst/>
+                <a:latin typeface="Arial" pitchFamily="-112" charset="0"/>
+                <a:ea typeface="ＭＳ Ｐゴシック" pitchFamily="-112" charset="-128"/>
+                <a:cs typeface="ＭＳ Ｐゴシック" pitchFamily="-112" charset="-128"/>
+              </a:rPr>
+              <a:t>[Reynolds2009] p. 19; overview</a:t>
+            </a:r>
           </a:p>
           <a:p>
             <a:pPr eaLnBrk="1" hangingPunct="1"/>
@@ -1836,7 +1900,7 @@
     </p:spTree>
     <p:extLst>
       <p:ext uri="{BB962C8B-B14F-4D97-AF65-F5344CB8AC3E}">
-        <p14:creationId xmlns:p14="http://schemas.microsoft.com/office/powerpoint/2010/main" val="1802591133"/>
+        <p14:creationId xmlns:p14="http://schemas.microsoft.com/office/powerpoint/2010/main" val="1143646880"/>
       </p:ext>
     </p:extLst>
   </p:cSld>
@@ -1885,7 +1949,7 @@
                 <a:latin typeface="Arial" pitchFamily="-106" charset="0"/>
               </a:rPr>
               <a:pPr/>
-              <a:t>21</a:t>
+              <a:t>20</a:t>
             </a:fld>
             <a:endParaRPr lang="de-DE">
               <a:latin typeface="Arial" pitchFamily="-106" charset="0"/>
@@ -1992,31 +2056,39 @@
             </a:endParaRPr>
           </a:p>
           <a:p>
-            <a:pPr eaLnBrk="1" hangingPunct="1">
-              <a:buClr>
-                <a:schemeClr val="accent1"/>
-              </a:buClr>
-              <a:buSzPct val="80000"/>
-              <a:buFont typeface=".AppleSDGothicNeoI-Regular" charset="-127"/>
-              <a:buChar char="◼︎"/>
-            </a:pPr>
-            <a:r>
-              <a:rPr lang="en-US" b="1" dirty="0">
-                <a:solidFill>
-                  <a:schemeClr val="accent1"/>
-                </a:solidFill>
-                <a:ea typeface="ＭＳ Ｐゴシック" pitchFamily="-106" charset="-128"/>
-                <a:cs typeface="ＭＳ Ｐゴシック" pitchFamily="-106" charset="-128"/>
-              </a:rPr>
-              <a:t>Discount Rate</a:t>
-            </a:r>
-            <a:r>
-              <a:rPr lang="en-US" dirty="0">
-                <a:ea typeface="ＭＳ Ｐゴシック" pitchFamily="-106" charset="-128"/>
-                <a:cs typeface="ＭＳ Ｐゴシック" pitchFamily="-106" charset="-128"/>
-              </a:rPr>
-              <a:t>: The rate that is used in cost-benefit analysis to discount future benefits (or costs). This is done because 1 dollar now is worth more than 1 dollar in 10 years.</a:t>
-            </a:r>
+            <a:r>
+              <a:rPr lang="en-GB" sz="1200" kern="1200" dirty="0">
+                <a:solidFill>
+                  <a:schemeClr val="tx1"/>
+                </a:solidFill>
+                <a:effectLst/>
+                <a:latin typeface="Arial" pitchFamily="-112" charset="0"/>
+                <a:ea typeface="ＭＳ Ｐゴシック" pitchFamily="-112" charset="-128"/>
+                <a:cs typeface="ＭＳ Ｐゴシック" pitchFamily="-112" charset="-128"/>
+              </a:rPr>
+              <a:t>Trump = </a:t>
+            </a:r>
+            <a:r>
+              <a:rPr lang="en-GB" sz="1200" kern="1200" dirty="0" err="1">
+                <a:solidFill>
+                  <a:schemeClr val="tx1"/>
+                </a:solidFill>
+                <a:effectLst/>
+                <a:latin typeface="Arial" pitchFamily="-112" charset="0"/>
+                <a:ea typeface="ＭＳ Ｐゴシック" pitchFamily="-112" charset="-128"/>
+                <a:cs typeface="ＭＳ Ｐゴシック" pitchFamily="-112" charset="-128"/>
+              </a:rPr>
+              <a:t>übertrumpfen</a:t>
+            </a:r>
+            <a:endParaRPr lang="en-GB" sz="1200" kern="1200" dirty="0">
+              <a:solidFill>
+                <a:schemeClr val="tx1"/>
+              </a:solidFill>
+              <a:effectLst/>
+              <a:latin typeface="Arial" pitchFamily="-112" charset="0"/>
+              <a:ea typeface="ＭＳ Ｐゴシック" pitchFamily="-112" charset="-128"/>
+              <a:cs typeface="ＭＳ Ｐゴシック" pitchFamily="-112" charset="-128"/>
+            </a:endParaRPr>
           </a:p>
           <a:p>
             <a:pPr eaLnBrk="1" hangingPunct="1"/>
@@ -2031,7 +2103,7 @@
     </p:spTree>
     <p:extLst>
       <p:ext uri="{BB962C8B-B14F-4D97-AF65-F5344CB8AC3E}">
-        <p14:creationId xmlns:p14="http://schemas.microsoft.com/office/powerpoint/2010/main" val="1905269944"/>
+        <p14:creationId xmlns:p14="http://schemas.microsoft.com/office/powerpoint/2010/main" val="1802591133"/>
       </p:ext>
     </p:extLst>
   </p:cSld>
@@ -2080,7 +2152,7 @@
                 <a:latin typeface="Arial" pitchFamily="-106" charset="0"/>
               </a:rPr>
               <a:pPr/>
-              <a:t>22</a:t>
+              <a:t>21</a:t>
             </a:fld>
             <a:endParaRPr lang="de-DE">
               <a:latin typeface="Arial" pitchFamily="-106" charset="0"/>
@@ -2187,39 +2259,31 @@
             </a:endParaRPr>
           </a:p>
           <a:p>
-            <a:r>
-              <a:rPr lang="en-GB" sz="1200" kern="1200" dirty="0">
-                <a:solidFill>
-                  <a:schemeClr val="tx1"/>
-                </a:solidFill>
-                <a:effectLst/>
-                <a:latin typeface="Arial" pitchFamily="-112" charset="0"/>
-                <a:ea typeface="ＭＳ Ｐゴシック" pitchFamily="-112" charset="-128"/>
-                <a:cs typeface="ＭＳ Ｐゴシック" pitchFamily="-112" charset="-128"/>
-              </a:rPr>
-              <a:t>Trump = </a:t>
-            </a:r>
-            <a:r>
-              <a:rPr lang="en-GB" sz="1200" kern="1200">
-                <a:solidFill>
-                  <a:schemeClr val="tx1"/>
-                </a:solidFill>
-                <a:effectLst/>
-                <a:latin typeface="Arial" pitchFamily="-112" charset="0"/>
-                <a:ea typeface="ＭＳ Ｐゴシック" pitchFamily="-112" charset="-128"/>
-                <a:cs typeface="ＭＳ Ｐゴシック" pitchFamily="-112" charset="-128"/>
-              </a:rPr>
-              <a:t>übertrumpfen</a:t>
-            </a:r>
-            <a:endParaRPr lang="en-GB" sz="1200" kern="1200" dirty="0">
-              <a:solidFill>
-                <a:schemeClr val="tx1"/>
-              </a:solidFill>
-              <a:effectLst/>
-              <a:latin typeface="Arial" pitchFamily="-112" charset="0"/>
-              <a:ea typeface="ＭＳ Ｐゴシック" pitchFamily="-112" charset="-128"/>
-              <a:cs typeface="ＭＳ Ｐゴシック" pitchFamily="-112" charset="-128"/>
-            </a:endParaRPr>
+            <a:pPr eaLnBrk="1" hangingPunct="1">
+              <a:buClr>
+                <a:schemeClr val="accent1"/>
+              </a:buClr>
+              <a:buSzPct val="80000"/>
+              <a:buFont typeface=".AppleSDGothicNeoI-Regular" charset="-127"/>
+              <a:buChar char="◼︎"/>
+            </a:pPr>
+            <a:r>
+              <a:rPr lang="en-US" b="1" dirty="0">
+                <a:solidFill>
+                  <a:schemeClr val="accent1"/>
+                </a:solidFill>
+                <a:ea typeface="ＭＳ Ｐゴシック" pitchFamily="-106" charset="-128"/>
+                <a:cs typeface="ＭＳ Ｐゴシック" pitchFamily="-106" charset="-128"/>
+              </a:rPr>
+              <a:t>Discount Rate</a:t>
+            </a:r>
+            <a:r>
+              <a:rPr lang="en-US" dirty="0">
+                <a:ea typeface="ＭＳ Ｐゴシック" pitchFamily="-106" charset="-128"/>
+                <a:cs typeface="ＭＳ Ｐゴシック" pitchFamily="-106" charset="-128"/>
+              </a:rPr>
+              <a:t>: The rate that is used in cost-benefit analysis to discount future benefits (or costs). This is done because 1 dollar now is worth more than 1 dollar in 10 years.</a:t>
+            </a:r>
           </a:p>
           <a:p>
             <a:pPr eaLnBrk="1" hangingPunct="1"/>
@@ -2234,7 +2298,7 @@
     </p:spTree>
     <p:extLst>
       <p:ext uri="{BB962C8B-B14F-4D97-AF65-F5344CB8AC3E}">
-        <p14:creationId xmlns:p14="http://schemas.microsoft.com/office/powerpoint/2010/main" val="933869147"/>
+        <p14:creationId xmlns:p14="http://schemas.microsoft.com/office/powerpoint/2010/main" val="1905269944"/>
       </p:ext>
     </p:extLst>
   </p:cSld>
@@ -2283,7 +2347,7 @@
                 <a:latin typeface="Arial" pitchFamily="-106" charset="0"/>
               </a:rPr>
               <a:pPr/>
-              <a:t>23</a:t>
+              <a:t>22</a:t>
             </a:fld>
             <a:endParaRPr lang="de-DE">
               <a:latin typeface="Arial" pitchFamily="-106" charset="0"/>
@@ -2437,7 +2501,7 @@
     </p:spTree>
     <p:extLst>
       <p:ext uri="{BB962C8B-B14F-4D97-AF65-F5344CB8AC3E}">
-        <p14:creationId xmlns:p14="http://schemas.microsoft.com/office/powerpoint/2010/main" val="1122729788"/>
+        <p14:creationId xmlns:p14="http://schemas.microsoft.com/office/powerpoint/2010/main" val="933869147"/>
       </p:ext>
     </p:extLst>
   </p:cSld>
@@ -2486,7 +2550,7 @@
                 <a:latin typeface="Arial" pitchFamily="-106" charset="0"/>
               </a:rPr>
               <a:pPr/>
-              <a:t>24</a:t>
+              <a:t>23</a:t>
             </a:fld>
             <a:endParaRPr lang="de-DE">
               <a:latin typeface="Arial" pitchFamily="-106" charset="0"/>
@@ -2640,7 +2704,7 @@
     </p:spTree>
     <p:extLst>
       <p:ext uri="{BB962C8B-B14F-4D97-AF65-F5344CB8AC3E}">
-        <p14:creationId xmlns:p14="http://schemas.microsoft.com/office/powerpoint/2010/main" val="606564473"/>
+        <p14:creationId xmlns:p14="http://schemas.microsoft.com/office/powerpoint/2010/main" val="1122729788"/>
       </p:ext>
     </p:extLst>
   </p:cSld>
@@ -2689,7 +2753,7 @@
                 <a:latin typeface="Arial" pitchFamily="-106" charset="0"/>
               </a:rPr>
               <a:pPr/>
-              <a:t>25</a:t>
+              <a:t>24</a:t>
             </a:fld>
             <a:endParaRPr lang="de-DE">
               <a:latin typeface="Arial" pitchFamily="-106" charset="0"/>
@@ -2843,7 +2907,7 @@
     </p:spTree>
     <p:extLst>
       <p:ext uri="{BB962C8B-B14F-4D97-AF65-F5344CB8AC3E}">
-        <p14:creationId xmlns:p14="http://schemas.microsoft.com/office/powerpoint/2010/main" val="673686891"/>
+        <p14:creationId xmlns:p14="http://schemas.microsoft.com/office/powerpoint/2010/main" val="606564473"/>
       </p:ext>
     </p:extLst>
   </p:cSld>
@@ -3159,6 +3223,209 @@
                 <a:latin typeface="Arial" pitchFamily="-106" charset="0"/>
               </a:rPr>
               <a:pPr/>
+              <a:t>25</a:t>
+            </a:fld>
+            <a:endParaRPr lang="de-DE">
+              <a:latin typeface="Arial" pitchFamily="-106" charset="0"/>
+            </a:endParaRPr>
+          </a:p>
+        </p:txBody>
+      </p:sp>
+      <p:sp>
+        <p:nvSpPr>
+          <p:cNvPr id="33795" name="Rectangle 2"/>
+          <p:cNvSpPr>
+            <a:spLocks noGrp="1" noRot="1" noChangeAspect="1" noChangeArrowheads="1" noTextEdit="1"/>
+          </p:cNvSpPr>
+          <p:nvPr>
+            <p:ph type="sldImg"/>
+          </p:nvPr>
+        </p:nvSpPr>
+        <p:spPr>
+          <a:ln/>
+        </p:spPr>
+      </p:sp>
+      <p:sp>
+        <p:nvSpPr>
+          <p:cNvPr id="33796" name="Rectangle 3"/>
+          <p:cNvSpPr>
+            <a:spLocks noGrp="1" noChangeArrowheads="1"/>
+          </p:cNvSpPr>
+          <p:nvPr>
+            <p:ph type="body" idx="1"/>
+          </p:nvPr>
+        </p:nvSpPr>
+        <p:spPr>
+          <a:noFill/>
+          <a:ln/>
+        </p:spPr>
+        <p:txBody>
+          <a:bodyPr/>
+          <a:lstStyle/>
+          <a:p>
+            <a:r>
+              <a:rPr lang="en-GB" sz="1200" kern="1200" dirty="0">
+                <a:solidFill>
+                  <a:schemeClr val="tx1"/>
+                </a:solidFill>
+                <a:effectLst/>
+                <a:latin typeface="Arial" pitchFamily="-112" charset="0"/>
+                <a:ea typeface="ＭＳ Ｐゴシック" pitchFamily="-112" charset="-128"/>
+                <a:cs typeface="ＭＳ Ｐゴシック" pitchFamily="-112" charset="-128"/>
+              </a:rPr>
+              <a:t>[dePoel&amp;Royakkers2011] Chapter 6, 7?, 8, 10?</a:t>
+            </a:r>
+          </a:p>
+          <a:p>
+            <a:r>
+              <a:rPr lang="en-GB" sz="1200" kern="1200" dirty="0">
+                <a:solidFill>
+                  <a:schemeClr val="tx1"/>
+                </a:solidFill>
+                <a:effectLst/>
+                <a:latin typeface="Arial" pitchFamily="-112" charset="0"/>
+                <a:ea typeface="ＭＳ Ｐゴシック" pitchFamily="-112" charset="-128"/>
+                <a:cs typeface="ＭＳ Ｐゴシック" pitchFamily="-112" charset="-128"/>
+              </a:rPr>
+              <a:t> </a:t>
+            </a:r>
+          </a:p>
+          <a:p>
+            <a:r>
+              <a:rPr lang="en-GB" sz="1200" kern="1200" dirty="0">
+                <a:solidFill>
+                  <a:schemeClr val="tx1"/>
+                </a:solidFill>
+                <a:effectLst/>
+                <a:latin typeface="Arial" pitchFamily="-112" charset="0"/>
+                <a:ea typeface="ＭＳ Ｐゴシック" pitchFamily="-112" charset="-128"/>
+                <a:cs typeface="ＭＳ Ｐゴシック" pitchFamily="-112" charset="-128"/>
+              </a:rPr>
+              <a:t>[Fleddermann2013] p. 67 line charting</a:t>
+            </a:r>
+          </a:p>
+          <a:p>
+            <a:r>
+              <a:rPr lang="en-GB" sz="1200" kern="1200" dirty="0">
+                <a:solidFill>
+                  <a:schemeClr val="tx1"/>
+                </a:solidFill>
+                <a:effectLst/>
+                <a:latin typeface="Arial" pitchFamily="-112" charset="0"/>
+                <a:ea typeface="ＭＳ Ｐゴシック" pitchFamily="-112" charset="-128"/>
+                <a:cs typeface="ＭＳ Ｐゴシック" pitchFamily="-112" charset="-128"/>
+              </a:rPr>
+              <a:t>[Fleddermann2013] p. 70 flow charting</a:t>
+            </a:r>
+          </a:p>
+          <a:p>
+            <a:endParaRPr lang="en-GB" sz="1200" kern="1200" dirty="0">
+              <a:solidFill>
+                <a:schemeClr val="tx1"/>
+              </a:solidFill>
+              <a:effectLst/>
+              <a:latin typeface="Arial" pitchFamily="-112" charset="0"/>
+              <a:ea typeface="ＭＳ Ｐゴシック" pitchFamily="-112" charset="-128"/>
+              <a:cs typeface="ＭＳ Ｐゴシック" pitchFamily="-112" charset="-128"/>
+            </a:endParaRPr>
+          </a:p>
+          <a:p>
+            <a:r>
+              <a:rPr lang="en-GB" sz="1200" kern="1200" dirty="0">
+                <a:solidFill>
+                  <a:schemeClr val="tx1"/>
+                </a:solidFill>
+                <a:effectLst/>
+                <a:latin typeface="Arial" pitchFamily="-112" charset="0"/>
+                <a:ea typeface="ＭＳ Ｐゴシック" pitchFamily="-112" charset="-128"/>
+                <a:cs typeface="ＭＳ Ｐゴシック" pitchFamily="-112" charset="-128"/>
+              </a:rPr>
+              <a:t>Trump = </a:t>
+            </a:r>
+            <a:r>
+              <a:rPr lang="en-GB" sz="1200" kern="1200">
+                <a:solidFill>
+                  <a:schemeClr val="tx1"/>
+                </a:solidFill>
+                <a:effectLst/>
+                <a:latin typeface="Arial" pitchFamily="-112" charset="0"/>
+                <a:ea typeface="ＭＳ Ｐゴシック" pitchFamily="-112" charset="-128"/>
+                <a:cs typeface="ＭＳ Ｐゴシック" pitchFamily="-112" charset="-128"/>
+              </a:rPr>
+              <a:t>übertrumpfen</a:t>
+            </a:r>
+            <a:endParaRPr lang="en-GB" sz="1200" kern="1200" dirty="0">
+              <a:solidFill>
+                <a:schemeClr val="tx1"/>
+              </a:solidFill>
+              <a:effectLst/>
+              <a:latin typeface="Arial" pitchFamily="-112" charset="0"/>
+              <a:ea typeface="ＭＳ Ｐゴシック" pitchFamily="-112" charset="-128"/>
+              <a:cs typeface="ＭＳ Ｐゴシック" pitchFamily="-112" charset="-128"/>
+            </a:endParaRPr>
+          </a:p>
+          <a:p>
+            <a:pPr eaLnBrk="1" hangingPunct="1"/>
+            <a:endParaRPr lang="de-DE" dirty="0">
+              <a:latin typeface="Arial" pitchFamily="-106" charset="0"/>
+              <a:ea typeface="ＭＳ Ｐゴシック" pitchFamily="-106" charset="-128"/>
+              <a:cs typeface="ＭＳ Ｐゴシック" pitchFamily="-106" charset="-128"/>
+            </a:endParaRPr>
+          </a:p>
+        </p:txBody>
+      </p:sp>
+    </p:spTree>
+    <p:extLst>
+      <p:ext uri="{BB962C8B-B14F-4D97-AF65-F5344CB8AC3E}">
+        <p14:creationId xmlns:p14="http://schemas.microsoft.com/office/powerpoint/2010/main" val="673686891"/>
+      </p:ext>
+    </p:extLst>
+  </p:cSld>
+  <p:clrMapOvr>
+    <a:masterClrMapping/>
+  </p:clrMapOvr>
+</p:notes>
+</file>
+
+<file path=ppt/notesSlides/notesSlide21.xml><?xml version="1.0" encoding="utf-8"?>
+<p:notes xmlns:a="http://schemas.openxmlformats.org/drawingml/2006/main" xmlns:r="http://schemas.openxmlformats.org/officeDocument/2006/relationships" xmlns:p="http://schemas.openxmlformats.org/presentationml/2006/main">
+  <p:cSld>
+    <p:spTree>
+      <p:nvGrpSpPr>
+        <p:cNvPr id="1" name=""/>
+        <p:cNvGrpSpPr/>
+        <p:nvPr/>
+      </p:nvGrpSpPr>
+      <p:grpSpPr>
+        <a:xfrm>
+          <a:off x="0" y="0"/>
+          <a:ext cx="0" cy="0"/>
+          <a:chOff x="0" y="0"/>
+          <a:chExt cx="0" cy="0"/>
+        </a:xfrm>
+      </p:grpSpPr>
+      <p:sp>
+        <p:nvSpPr>
+          <p:cNvPr id="33794" name="Rectangle 7"/>
+          <p:cNvSpPr>
+            <a:spLocks noGrp="1" noChangeArrowheads="1"/>
+          </p:cNvSpPr>
+          <p:nvPr>
+            <p:ph type="sldNum" sz="quarter" idx="5"/>
+          </p:nvPr>
+        </p:nvSpPr>
+        <p:spPr>
+          <a:noFill/>
+        </p:spPr>
+        <p:txBody>
+          <a:bodyPr/>
+          <a:lstStyle/>
+          <a:p>
+            <a:fld id="{8F61D901-1668-E44B-9E88-0B533135EDF4}" type="slidenum">
+              <a:rPr lang="de-DE">
+                <a:latin typeface="Arial" pitchFamily="-106" charset="0"/>
+              </a:rPr>
+              <a:pPr/>
               <a:t>26</a:t>
             </a:fld>
             <a:endParaRPr lang="de-DE">
@@ -3240,245 +3507,198 @@
       </p:grpSpPr>
       <p:sp>
         <p:nvSpPr>
-          <p:cNvPr id="33794" name="Rectangle 7"/>
-          <p:cNvSpPr>
-            <a:spLocks noGrp="1" noChangeArrowheads="1"/>
-          </p:cNvSpPr>
-          <p:nvPr>
-            <p:ph type="sldNum" sz="quarter" idx="5"/>
-          </p:nvPr>
-        </p:nvSpPr>
-        <p:spPr>
-          <a:noFill/>
-        </p:spPr>
+          <p:cNvPr id="2" name="Slide Image Placeholder 1"/>
+          <p:cNvSpPr>
+            <a:spLocks noGrp="1" noRot="1" noChangeAspect="1"/>
+          </p:cNvSpPr>
+          <p:nvPr>
+            <p:ph type="sldImg"/>
+          </p:nvPr>
+        </p:nvSpPr>
+        <p:spPr/>
+      </p:sp>
+      <p:sp>
+        <p:nvSpPr>
+          <p:cNvPr id="3" name="Notes Placeholder 2"/>
+          <p:cNvSpPr>
+            <a:spLocks noGrp="1"/>
+          </p:cNvSpPr>
+          <p:nvPr>
+            <p:ph type="body" idx="1"/>
+          </p:nvPr>
+        </p:nvSpPr>
+        <p:spPr/>
         <p:txBody>
           <a:bodyPr/>
           <a:lstStyle/>
           <a:p>
-            <a:fld id="{8F61D901-1668-E44B-9E88-0B533135EDF4}" type="slidenum">
-              <a:rPr lang="de-DE">
-                <a:latin typeface="Arial" pitchFamily="-106" charset="0"/>
-              </a:rPr>
-              <a:pPr/>
-              <a:t>9</a:t>
-            </a:fld>
-            <a:endParaRPr lang="de-DE">
-              <a:latin typeface="Arial" pitchFamily="-106" charset="0"/>
-            </a:endParaRPr>
-          </a:p>
-        </p:txBody>
-      </p:sp>
-      <p:sp>
-        <p:nvSpPr>
-          <p:cNvPr id="33795" name="Rectangle 2"/>
-          <p:cNvSpPr>
-            <a:spLocks noGrp="1" noRot="1" noChangeAspect="1" noChangeArrowheads="1" noTextEdit="1"/>
-          </p:cNvSpPr>
-          <p:nvPr>
-            <p:ph type="sldImg"/>
-          </p:nvPr>
-        </p:nvSpPr>
-        <p:spPr>
-          <a:ln/>
-        </p:spPr>
-      </p:sp>
-      <p:sp>
-        <p:nvSpPr>
-          <p:cNvPr id="33796" name="Rectangle 3"/>
-          <p:cNvSpPr>
-            <a:spLocks noGrp="1" noChangeArrowheads="1"/>
-          </p:cNvSpPr>
-          <p:nvPr>
-            <p:ph type="body" idx="1"/>
-          </p:nvPr>
-        </p:nvSpPr>
-        <p:spPr>
-          <a:noFill/>
-          <a:ln/>
-        </p:spPr>
+            <a:r>
+              <a:rPr lang="en-US" dirty="0"/>
+              <a:t>Transport Robot?</a:t>
+            </a:r>
+          </a:p>
+          <a:p>
+            <a:r>
+              <a:rPr lang="en-US" dirty="0"/>
+              <a:t>All transportation Robots follow the Asimov Law</a:t>
+            </a:r>
+          </a:p>
+          <a:p>
+            <a:r>
+              <a:rPr lang="en-US" dirty="0"/>
+              <a:t>Transportation robots </a:t>
+            </a:r>
+          </a:p>
+          <a:p>
+            <a:r>
+              <a:rPr lang="en-US" dirty="0"/>
+              <a:t>---------------------------------------</a:t>
+            </a:r>
+          </a:p>
+          <a:p>
+            <a:r>
+              <a:rPr lang="en-US" dirty="0"/>
+              <a:t>Privacy example</a:t>
+            </a:r>
+          </a:p>
+          <a:p>
+            <a:r>
+              <a:rPr lang="en-US" dirty="0"/>
+              <a:t>- Bigger Class guarantees </a:t>
+            </a:r>
+          </a:p>
+          <a:p>
+            <a:r>
+              <a:rPr lang="en-US" dirty="0"/>
+              <a:t>- One is subclass</a:t>
+            </a:r>
+          </a:p>
+          <a:p>
+            <a:r>
+              <a:rPr lang="en-US" dirty="0"/>
+              <a:t>- However, there is a case </a:t>
+            </a:r>
+          </a:p>
+          <a:p>
+            <a:r>
+              <a:rPr lang="en-US" dirty="0"/>
+              <a:t>----------------------------------------</a:t>
+            </a:r>
+          </a:p>
+          <a:p>
+            <a:r>
+              <a:rPr lang="en-US" dirty="0"/>
+              <a:t>Argument-1 No </a:t>
+            </a:r>
+            <a:r>
+              <a:rPr lang="en-US" dirty="0" err="1"/>
+              <a:t>Vli</a:t>
+            </a:r>
+            <a:endParaRPr lang="en-US" dirty="0"/>
+          </a:p>
+          <a:p>
+            <a:r>
+              <a:rPr lang="en-US" dirty="0"/>
+              <a:t>First argument is not valid because we need an automation that guarantees that </a:t>
+            </a:r>
+          </a:p>
+          <a:p>
+            <a:r>
+              <a:rPr lang="en-US" dirty="0"/>
+              <a:t>Many accidents happen because humans are sleeping or unfocused</a:t>
+            </a:r>
+          </a:p>
+          <a:p>
+            <a:r>
+              <a:rPr lang="en-US" dirty="0"/>
+              <a:t>White truck as a cloud?</a:t>
+            </a:r>
+          </a:p>
+          <a:p>
+            <a:r>
+              <a:rPr lang="en-US" dirty="0"/>
+              <a:t>Replace the human not removed the human</a:t>
+            </a:r>
+          </a:p>
+          <a:p>
+            <a:r>
+              <a:rPr lang="en-US" dirty="0"/>
+              <a:t>The automated driving will not add new failures or change the character of the </a:t>
+            </a:r>
+            <a:r>
+              <a:rPr lang="en-US"/>
+              <a:t>remaining failures</a:t>
+            </a:r>
+            <a:endParaRPr lang="en-US" dirty="0"/>
+          </a:p>
+          <a:p>
+            <a:r>
+              <a:rPr lang="en-US" dirty="0"/>
+              <a:t>Humans make random failures, while automated driving makes systematic failure</a:t>
+            </a:r>
+          </a:p>
+          <a:p>
+            <a:r>
+              <a:rPr lang="en-US" dirty="0"/>
+              <a:t>Popular impression is that Tesla is unsafe</a:t>
+            </a:r>
+          </a:p>
+          <a:p>
+            <a:r>
+              <a:rPr lang="en-US" dirty="0"/>
+              <a:t>----------------------------------------------------------------------------------------------</a:t>
+            </a:r>
+          </a:p>
+          <a:p>
+            <a:r>
+              <a:rPr lang="en-US" dirty="0"/>
+              <a:t>Valid argument with the wrong premise </a:t>
+            </a:r>
+          </a:p>
+          <a:p>
+            <a:r>
+              <a:rPr lang="en-US" dirty="0"/>
+              <a:t>True of the premises and the correctness of the argument</a:t>
+            </a:r>
+          </a:p>
+          <a:p>
+            <a:r>
+              <a:rPr lang="en-US" dirty="0"/>
+              <a:t>All robots follow</a:t>
+            </a:r>
+          </a:p>
+          <a:p>
+            <a:endParaRPr lang="en-US" dirty="0"/>
+          </a:p>
+        </p:txBody>
+      </p:sp>
+      <p:sp>
+        <p:nvSpPr>
+          <p:cNvPr id="4" name="Slide Number Placeholder 3"/>
+          <p:cNvSpPr>
+            <a:spLocks noGrp="1"/>
+          </p:cNvSpPr>
+          <p:nvPr>
+            <p:ph type="sldNum" sz="quarter" idx="5"/>
+          </p:nvPr>
+        </p:nvSpPr>
+        <p:spPr/>
         <p:txBody>
           <a:bodyPr/>
           <a:lstStyle/>
           <a:p>
-            <a:r>
-              <a:rPr lang="en-GB" sz="1200" kern="1200" dirty="0">
-                <a:solidFill>
-                  <a:schemeClr val="tx1"/>
-                </a:solidFill>
-                <a:effectLst/>
-                <a:latin typeface="Arial" pitchFamily="-112" charset="0"/>
-                <a:ea typeface="ＭＳ Ｐゴシック" pitchFamily="-112" charset="-128"/>
-                <a:cs typeface="ＭＳ Ｐゴシック" pitchFamily="-112" charset="-128"/>
-              </a:rPr>
-              <a:t>[dePoel&amp;Royakkers2011] Chapter 3, 4, 5</a:t>
-            </a:r>
-          </a:p>
-          <a:p>
-            <a:r>
-              <a:rPr lang="en-GB" sz="1200" kern="1200" dirty="0">
-                <a:solidFill>
-                  <a:schemeClr val="tx1"/>
-                </a:solidFill>
-                <a:effectLst/>
-                <a:latin typeface="Arial" pitchFamily="-112" charset="0"/>
-                <a:ea typeface="ＭＳ Ｐゴシック" pitchFamily="-112" charset="-128"/>
-                <a:cs typeface="ＭＳ Ｐゴシック" pitchFamily="-112" charset="-128"/>
-              </a:rPr>
-              <a:t>[Pereira&amp;Saptawijaya2016] p. 110 </a:t>
-            </a:r>
-            <a:r>
-              <a:rPr lang="en-GB" sz="1200" kern="1200" dirty="0" err="1">
-                <a:solidFill>
-                  <a:schemeClr val="tx1"/>
-                </a:solidFill>
-                <a:effectLst/>
-                <a:latin typeface="Arial" pitchFamily="-112" charset="0"/>
-                <a:ea typeface="ＭＳ Ｐゴシック" pitchFamily="-112" charset="-128"/>
-                <a:cs typeface="ＭＳ Ｐゴシック" pitchFamily="-112" charset="-128"/>
-              </a:rPr>
-              <a:t>trolly</a:t>
-            </a:r>
-            <a:r>
-              <a:rPr lang="en-GB" sz="1200" kern="1200" dirty="0">
-                <a:solidFill>
-                  <a:schemeClr val="tx1"/>
-                </a:solidFill>
-                <a:effectLst/>
-                <a:latin typeface="Arial" pitchFamily="-112" charset="0"/>
-                <a:ea typeface="ＭＳ Ｐゴシック" pitchFamily="-112" charset="-128"/>
-                <a:cs typeface="ＭＳ Ｐゴシック" pitchFamily="-112" charset="-128"/>
-              </a:rPr>
-              <a:t> problem in different forms? Use to explain differences?</a:t>
-            </a:r>
-          </a:p>
-          <a:p>
-            <a:r>
-              <a:rPr lang="en-GB" sz="1200" kern="1200" dirty="0">
-                <a:solidFill>
-                  <a:schemeClr val="tx1"/>
-                </a:solidFill>
-                <a:effectLst/>
-                <a:latin typeface="Arial" pitchFamily="-112" charset="0"/>
-                <a:ea typeface="ＭＳ Ｐゴシック" pitchFamily="-112" charset="-128"/>
-                <a:cs typeface="ＭＳ Ｐゴシック" pitchFamily="-112" charset="-128"/>
-              </a:rPr>
-              <a:t>[Pereira&amp;Saptawijaya2016] p. 20 double and triple effect &amp;  </a:t>
-            </a:r>
-            <a:r>
-              <a:rPr lang="en-GB" sz="1200" kern="1200" dirty="0" err="1">
-                <a:solidFill>
-                  <a:schemeClr val="tx1"/>
-                </a:solidFill>
-                <a:effectLst/>
-                <a:latin typeface="Arial" pitchFamily="-112" charset="0"/>
-                <a:ea typeface="ＭＳ Ｐゴシック" pitchFamily="-112" charset="-128"/>
-                <a:cs typeface="ＭＳ Ｐゴシック" pitchFamily="-112" charset="-128"/>
-              </a:rPr>
-              <a:t>trolly</a:t>
-            </a:r>
-            <a:r>
-              <a:rPr lang="en-GB" sz="1200" kern="1200" dirty="0">
-                <a:solidFill>
-                  <a:schemeClr val="tx1"/>
-                </a:solidFill>
-                <a:effectLst/>
-                <a:latin typeface="Arial" pitchFamily="-112" charset="0"/>
-                <a:ea typeface="ＭＳ Ｐゴシック" pitchFamily="-112" charset="-128"/>
-                <a:cs typeface="ＭＳ Ｐゴシック" pitchFamily="-112" charset="-128"/>
-              </a:rPr>
-              <a:t> problem </a:t>
-            </a:r>
-          </a:p>
-          <a:p>
-            <a:r>
-              <a:rPr lang="en-GB" sz="1200" kern="1200" dirty="0">
-                <a:solidFill>
-                  <a:schemeClr val="tx1"/>
-                </a:solidFill>
-                <a:effectLst/>
-                <a:latin typeface="Arial" pitchFamily="-112" charset="0"/>
-                <a:ea typeface="ＭＳ Ｐゴシック" pitchFamily="-112" charset="-128"/>
-                <a:cs typeface="ＭＳ Ｐゴシック" pitchFamily="-112" charset="-128"/>
-              </a:rPr>
-              <a:t> [Kizza2013] Chapter 3 Ethics </a:t>
-            </a:r>
-            <a:r>
-              <a:rPr lang="en-GB" sz="1200" kern="1200" dirty="0" err="1">
-                <a:solidFill>
-                  <a:schemeClr val="tx1"/>
-                </a:solidFill>
-                <a:effectLst/>
-                <a:latin typeface="Arial" pitchFamily="-112" charset="0"/>
-                <a:ea typeface="ＭＳ Ｐゴシック" pitchFamily="-112" charset="-128"/>
-                <a:cs typeface="ＭＳ Ｐゴシック" pitchFamily="-112" charset="-128"/>
-              </a:rPr>
-              <a:t>abd</a:t>
-            </a:r>
-            <a:r>
-              <a:rPr lang="en-GB" sz="1200" kern="1200" dirty="0">
-                <a:solidFill>
-                  <a:schemeClr val="tx1"/>
-                </a:solidFill>
-                <a:effectLst/>
-                <a:latin typeface="Arial" pitchFamily="-112" charset="0"/>
-                <a:ea typeface="ＭＳ Ｐゴシック" pitchFamily="-112" charset="-128"/>
-                <a:cs typeface="ＭＳ Ｐゴシック" pitchFamily="-112" charset="-128"/>
-              </a:rPr>
-              <a:t> </a:t>
-            </a:r>
-            <a:r>
-              <a:rPr lang="en-GB" sz="1200" kern="1200" dirty="0" err="1">
-                <a:solidFill>
-                  <a:schemeClr val="tx1"/>
-                </a:solidFill>
-                <a:effectLst/>
-                <a:latin typeface="Arial" pitchFamily="-112" charset="0"/>
-                <a:ea typeface="ＭＳ Ｐゴシック" pitchFamily="-112" charset="-128"/>
-                <a:cs typeface="ＭＳ Ｐゴシック" pitchFamily="-112" charset="-128"/>
-              </a:rPr>
-              <a:t>Ethecial</a:t>
-            </a:r>
-            <a:r>
-              <a:rPr lang="en-GB" sz="1200" kern="1200" dirty="0">
-                <a:solidFill>
-                  <a:schemeClr val="tx1"/>
-                </a:solidFill>
-                <a:effectLst/>
-                <a:latin typeface="Arial" pitchFamily="-112" charset="0"/>
-                <a:ea typeface="ＭＳ Ｐゴシック" pitchFamily="-112" charset="-128"/>
-                <a:cs typeface="ＭＳ Ｐゴシック" pitchFamily="-112" charset="-128"/>
-              </a:rPr>
-              <a:t> Analysis</a:t>
-            </a:r>
-          </a:p>
-          <a:p>
-            <a:r>
-              <a:rPr lang="en-GB" sz="1200" kern="1200" dirty="0">
-                <a:solidFill>
-                  <a:schemeClr val="tx1"/>
-                </a:solidFill>
-                <a:effectLst/>
-                <a:latin typeface="Arial" pitchFamily="-112" charset="0"/>
-                <a:ea typeface="ＭＳ Ｐゴシック" pitchFamily="-112" charset="-128"/>
-                <a:cs typeface="ＭＳ Ｐゴシック" pitchFamily="-112" charset="-128"/>
-              </a:rPr>
-              <a:t>[Reynolds2009] p. 19; overview</a:t>
-            </a:r>
-          </a:p>
-          <a:p>
-            <a:pPr eaLnBrk="1" hangingPunct="1"/>
-            <a:endParaRPr lang="de-DE" dirty="0">
-              <a:latin typeface="Arial" pitchFamily="-106" charset="0"/>
-              <a:ea typeface="ＭＳ Ｐゴシック" pitchFamily="-106" charset="-128"/>
-              <a:cs typeface="ＭＳ Ｐゴシック" pitchFamily="-106" charset="-128"/>
-            </a:endParaRPr>
+            <a:fld id="{5C9D6992-95B8-421A-A0EE-FC9CB6B4B801}" type="slidenum">
+              <a:rPr lang="en-US" smtClean="0"/>
+              <a:t>5</a:t>
+            </a:fld>
+            <a:endParaRPr lang="en-US"/>
           </a:p>
         </p:txBody>
       </p:sp>
     </p:spTree>
     <p:extLst>
       <p:ext uri="{BB962C8B-B14F-4D97-AF65-F5344CB8AC3E}">
-        <p14:creationId xmlns:p14="http://schemas.microsoft.com/office/powerpoint/2010/main" val="482810059"/>
+        <p14:creationId xmlns:p14="http://schemas.microsoft.com/office/powerpoint/2010/main" val="4197162434"/>
       </p:ext>
     </p:extLst>
   </p:cSld>
@@ -3527,7 +3747,7 @@
                 <a:latin typeface="Arial" pitchFamily="-106" charset="0"/>
               </a:rPr>
               <a:pPr/>
-              <a:t>10</a:t>
+              <a:t>9</a:t>
             </a:fld>
             <a:endParaRPr lang="de-DE">
               <a:latin typeface="Arial" pitchFamily="-106" charset="0"/>
@@ -3745,7 +3965,7 @@
     </p:spTree>
     <p:extLst>
       <p:ext uri="{BB962C8B-B14F-4D97-AF65-F5344CB8AC3E}">
-        <p14:creationId xmlns:p14="http://schemas.microsoft.com/office/powerpoint/2010/main" val="338880646"/>
+        <p14:creationId xmlns:p14="http://schemas.microsoft.com/office/powerpoint/2010/main" val="482810059"/>
       </p:ext>
     </p:extLst>
   </p:cSld>
@@ -3794,7 +4014,7 @@
                 <a:latin typeface="Arial" pitchFamily="-106" charset="0"/>
               </a:rPr>
               <a:pPr/>
-              <a:t>11</a:t>
+              <a:t>10</a:t>
             </a:fld>
             <a:endParaRPr lang="de-DE">
               <a:latin typeface="Arial" pitchFamily="-106" charset="0"/>
@@ -4012,7 +4232,7 @@
     </p:spTree>
     <p:extLst>
       <p:ext uri="{BB962C8B-B14F-4D97-AF65-F5344CB8AC3E}">
-        <p14:creationId xmlns:p14="http://schemas.microsoft.com/office/powerpoint/2010/main" val="1624978405"/>
+        <p14:creationId xmlns:p14="http://schemas.microsoft.com/office/powerpoint/2010/main" val="338880646"/>
       </p:ext>
     </p:extLst>
   </p:cSld>
@@ -4061,7 +4281,7 @@
                 <a:latin typeface="Arial" pitchFamily="-106" charset="0"/>
               </a:rPr>
               <a:pPr/>
-              <a:t>12</a:t>
+              <a:t>11</a:t>
             </a:fld>
             <a:endParaRPr lang="de-DE">
               <a:latin typeface="Arial" pitchFamily="-106" charset="0"/>
@@ -4279,7 +4499,7 @@
     </p:spTree>
     <p:extLst>
       <p:ext uri="{BB962C8B-B14F-4D97-AF65-F5344CB8AC3E}">
-        <p14:creationId xmlns:p14="http://schemas.microsoft.com/office/powerpoint/2010/main" val="959768049"/>
+        <p14:creationId xmlns:p14="http://schemas.microsoft.com/office/powerpoint/2010/main" val="1624978405"/>
       </p:ext>
     </p:extLst>
   </p:cSld>
@@ -4328,7 +4548,7 @@
                 <a:latin typeface="Arial" pitchFamily="-106" charset="0"/>
               </a:rPr>
               <a:pPr/>
-              <a:t>13</a:t>
+              <a:t>12</a:t>
             </a:fld>
             <a:endParaRPr lang="de-DE">
               <a:latin typeface="Arial" pitchFamily="-106" charset="0"/>
@@ -4546,7 +4766,7 @@
     </p:spTree>
     <p:extLst>
       <p:ext uri="{BB962C8B-B14F-4D97-AF65-F5344CB8AC3E}">
-        <p14:creationId xmlns:p14="http://schemas.microsoft.com/office/powerpoint/2010/main" val="11614763"/>
+        <p14:creationId xmlns:p14="http://schemas.microsoft.com/office/powerpoint/2010/main" val="959768049"/>
       </p:ext>
     </p:extLst>
   </p:cSld>
@@ -4595,7 +4815,7 @@
                 <a:latin typeface="Arial" pitchFamily="-106" charset="0"/>
               </a:rPr>
               <a:pPr/>
-              <a:t>14</a:t>
+              <a:t>13</a:t>
             </a:fld>
             <a:endParaRPr lang="de-DE">
               <a:latin typeface="Arial" pitchFamily="-106" charset="0"/>
@@ -4808,41 +5028,12 @@
               <a:cs typeface="ＭＳ Ｐゴシック" pitchFamily="-106" charset="-128"/>
             </a:endParaRPr>
           </a:p>
-          <a:p>
-            <a:pPr eaLnBrk="1" hangingPunct="1"/>
-            <a:r>
-              <a:rPr lang="en-US" sz="1200" dirty="0">
-                <a:ea typeface="ＭＳ Ｐゴシック" pitchFamily="-106" charset="-128"/>
-                <a:cs typeface="ＭＳ Ｐゴシック" pitchFamily="-106" charset="-128"/>
-              </a:rPr>
-              <a:t>ought =</a:t>
-            </a:r>
-            <a:r>
-              <a:rPr lang="en-US" sz="1200" baseline="0" dirty="0">
-                <a:ea typeface="ＭＳ Ｐゴシック" pitchFamily="-106" charset="-128"/>
-                <a:cs typeface="ＭＳ Ｐゴシック" pitchFamily="-106" charset="-128"/>
-              </a:rPr>
-              <a:t> </a:t>
-            </a:r>
-            <a:r>
-              <a:rPr lang="en-US" sz="1200" baseline="0" dirty="0" err="1">
-                <a:ea typeface="ＭＳ Ｐゴシック" pitchFamily="-106" charset="-128"/>
-                <a:cs typeface="ＭＳ Ｐゴシック" pitchFamily="-106" charset="-128"/>
-              </a:rPr>
-              <a:t>müssen</a:t>
-            </a:r>
-            <a:endParaRPr lang="de-DE" dirty="0">
-              <a:latin typeface="Arial" pitchFamily="-106" charset="0"/>
-              <a:ea typeface="ＭＳ Ｐゴシック" pitchFamily="-106" charset="-128"/>
-              <a:cs typeface="ＭＳ Ｐゴシック" pitchFamily="-106" charset="-128"/>
-            </a:endParaRPr>
-          </a:p>
         </p:txBody>
       </p:sp>
     </p:spTree>
     <p:extLst>
       <p:ext uri="{BB962C8B-B14F-4D97-AF65-F5344CB8AC3E}">
-        <p14:creationId xmlns:p14="http://schemas.microsoft.com/office/powerpoint/2010/main" val="1201043949"/>
+        <p14:creationId xmlns:p14="http://schemas.microsoft.com/office/powerpoint/2010/main" val="11614763"/>
       </p:ext>
     </p:extLst>
   </p:cSld>
@@ -4891,7 +5082,7 @@
                 <a:latin typeface="Arial" pitchFamily="-106" charset="0"/>
               </a:rPr>
               <a:pPr/>
-              <a:t>15</a:t>
+              <a:t>14</a:t>
             </a:fld>
             <a:endParaRPr lang="de-DE">
               <a:latin typeface="Arial" pitchFamily="-106" charset="0"/>
@@ -5104,12 +5295,41 @@
               <a:cs typeface="ＭＳ Ｐゴシック" pitchFamily="-106" charset="-128"/>
             </a:endParaRPr>
           </a:p>
+          <a:p>
+            <a:pPr eaLnBrk="1" hangingPunct="1"/>
+            <a:r>
+              <a:rPr lang="en-US" sz="1200" dirty="0">
+                <a:ea typeface="ＭＳ Ｐゴシック" pitchFamily="-106" charset="-128"/>
+                <a:cs typeface="ＭＳ Ｐゴシック" pitchFamily="-106" charset="-128"/>
+              </a:rPr>
+              <a:t>ought =</a:t>
+            </a:r>
+            <a:r>
+              <a:rPr lang="en-US" sz="1200" baseline="0" dirty="0">
+                <a:ea typeface="ＭＳ Ｐゴシック" pitchFamily="-106" charset="-128"/>
+                <a:cs typeface="ＭＳ Ｐゴシック" pitchFamily="-106" charset="-128"/>
+              </a:rPr>
+              <a:t> </a:t>
+            </a:r>
+            <a:r>
+              <a:rPr lang="en-US" sz="1200" baseline="0" dirty="0" err="1">
+                <a:ea typeface="ＭＳ Ｐゴシック" pitchFamily="-106" charset="-128"/>
+                <a:cs typeface="ＭＳ Ｐゴシック" pitchFamily="-106" charset="-128"/>
+              </a:rPr>
+              <a:t>müssen</a:t>
+            </a:r>
+            <a:endParaRPr lang="de-DE" dirty="0">
+              <a:latin typeface="Arial" pitchFamily="-106" charset="0"/>
+              <a:ea typeface="ＭＳ Ｐゴシック" pitchFamily="-106" charset="-128"/>
+              <a:cs typeface="ＭＳ Ｐゴシック" pitchFamily="-106" charset="-128"/>
+            </a:endParaRPr>
+          </a:p>
         </p:txBody>
       </p:sp>
     </p:spTree>
     <p:extLst>
       <p:ext uri="{BB962C8B-B14F-4D97-AF65-F5344CB8AC3E}">
-        <p14:creationId xmlns:p14="http://schemas.microsoft.com/office/powerpoint/2010/main" val="1609927241"/>
+        <p14:creationId xmlns:p14="http://schemas.microsoft.com/office/powerpoint/2010/main" val="1201043949"/>
       </p:ext>
     </p:extLst>
   </p:cSld>
@@ -6843,7 +7063,7 @@
           <a:p>
             <a:fld id="{3E31344D-F2C8-4FF6-8877-1B13E96E243A}" type="datetimeFigureOut">
               <a:rPr lang="en-US" smtClean="0"/>
-              <a:t>11/17/2021</a:t>
+              <a:t>11/19/2021</a:t>
             </a:fld>
             <a:endParaRPr lang="en-US"/>
           </a:p>
@@ -7132,7 +7352,7 @@
           <a:p>
             <a:fld id="{3E31344D-F2C8-4FF6-8877-1B13E96E243A}" type="datetimeFigureOut">
               <a:rPr lang="en-US" smtClean="0"/>
-              <a:t>11/17/2021</a:t>
+              <a:t>11/19/2021</a:t>
             </a:fld>
             <a:endParaRPr lang="en-US"/>
           </a:p>
@@ -7421,7 +7641,7 @@
           <a:p>
             <a:fld id="{3E31344D-F2C8-4FF6-8877-1B13E96E243A}" type="datetimeFigureOut">
               <a:rPr lang="en-US" smtClean="0"/>
-              <a:t>11/17/2021</a:t>
+              <a:t>11/19/2021</a:t>
             </a:fld>
             <a:endParaRPr lang="en-US"/>
           </a:p>
@@ -7710,7 +7930,7 @@
           <a:p>
             <a:fld id="{3E31344D-F2C8-4FF6-8877-1B13E96E243A}" type="datetimeFigureOut">
               <a:rPr lang="en-US" smtClean="0"/>
-              <a:t>11/17/2021</a:t>
+              <a:t>11/19/2021</a:t>
             </a:fld>
             <a:endParaRPr lang="en-US"/>
           </a:p>
@@ -7947,7 +8167,7 @@
           <a:p>
             <a:fld id="{3E31344D-F2C8-4FF6-8877-1B13E96E243A}" type="datetimeFigureOut">
               <a:rPr lang="en-US" smtClean="0"/>
-              <a:t>11/17/2021</a:t>
+              <a:t>11/19/2021</a:t>
             </a:fld>
             <a:endParaRPr lang="en-US"/>
           </a:p>
@@ -8404,7 +8624,7 @@
           <a:p>
             <a:fld id="{3E31344D-F2C8-4FF6-8877-1B13E96E243A}" type="datetimeFigureOut">
               <a:rPr lang="en-US" smtClean="0"/>
-              <a:t>11/17/2021</a:t>
+              <a:t>11/19/2021</a:t>
             </a:fld>
             <a:endParaRPr lang="en-US"/>
           </a:p>
@@ -8595,7 +8815,7 @@
           <a:p>
             <a:fld id="{3E31344D-F2C8-4FF6-8877-1B13E96E243A}" type="datetimeFigureOut">
               <a:rPr lang="en-US" smtClean="0"/>
-              <a:t>11/17/2021</a:t>
+              <a:t>11/19/2021</a:t>
             </a:fld>
             <a:endParaRPr lang="en-US"/>
           </a:p>
@@ -8860,7 +9080,7 @@
           <a:p>
             <a:fld id="{3E31344D-F2C8-4FF6-8877-1B13E96E243A}" type="datetimeFigureOut">
               <a:rPr lang="en-US" smtClean="0"/>
-              <a:t>11/17/2021</a:t>
+              <a:t>11/19/2021</a:t>
             </a:fld>
             <a:endParaRPr lang="en-US"/>
           </a:p>
@@ -11233,7 +11453,7 @@
           <a:p>
             <a:fld id="{3E31344D-F2C8-4FF6-8877-1B13E96E243A}" type="datetimeFigureOut">
               <a:rPr lang="en-US" smtClean="0"/>
-              <a:t>11/17/2021</a:t>
+              <a:t>11/19/2021</a:t>
             </a:fld>
             <a:endParaRPr lang="en-US"/>
           </a:p>
@@ -11483,7 +11703,7 @@
           <a:p>
             <a:fld id="{3E31344D-F2C8-4FF6-8877-1B13E96E243A}" type="datetimeFigureOut">
               <a:rPr lang="en-US" smtClean="0"/>
-              <a:t>11/17/2021</a:t>
+              <a:t>11/19/2021</a:t>
             </a:fld>
             <a:endParaRPr lang="en-US"/>
           </a:p>
@@ -11869,7 +12089,7 @@
           <a:p>
             <a:fld id="{3E31344D-F2C8-4FF6-8877-1B13E96E243A}" type="datetimeFigureOut">
               <a:rPr lang="en-US" smtClean="0"/>
-              <a:t>11/17/2021</a:t>
+              <a:t>11/19/2021</a:t>
             </a:fld>
             <a:endParaRPr lang="en-US"/>
           </a:p>
@@ -12129,7 +12349,7 @@
           <a:p>
             <a:fld id="{3E31344D-F2C8-4FF6-8877-1B13E96E243A}" type="datetimeFigureOut">
               <a:rPr lang="en-US" smtClean="0"/>
-              <a:t>11/17/2021</a:t>
+              <a:t>11/19/2021</a:t>
             </a:fld>
             <a:endParaRPr lang="en-US"/>
           </a:p>
@@ -21450,7 +21670,7 @@
         </p:nvSpPr>
         <p:spPr bwMode="gray">
           <a:xfrm>
-            <a:off x="8319654" y="2644752"/>
+            <a:off x="8120973" y="2669585"/>
             <a:ext cx="914400" cy="221672"/>
           </a:xfrm>
           <a:prstGeom prst="rect">
@@ -21501,7 +21721,7 @@
         </p:nvSpPr>
         <p:spPr bwMode="gray">
           <a:xfrm>
-            <a:off x="8319654" y="2978774"/>
+            <a:off x="8120973" y="3003607"/>
             <a:ext cx="914400" cy="221672"/>
           </a:xfrm>
           <a:prstGeom prst="rect">
@@ -21552,7 +21772,7 @@
         </p:nvSpPr>
         <p:spPr bwMode="gray">
           <a:xfrm>
-            <a:off x="8319654" y="3291458"/>
+            <a:off x="8120973" y="3316291"/>
             <a:ext cx="914400" cy="221672"/>
           </a:xfrm>
           <a:prstGeom prst="rect">
@@ -21656,7 +21876,7 @@
         </p:nvSpPr>
         <p:spPr bwMode="gray">
           <a:xfrm>
-            <a:off x="7405254" y="4184669"/>
+            <a:off x="8120973" y="4178364"/>
             <a:ext cx="914400" cy="221672"/>
           </a:xfrm>
           <a:prstGeom prst="rect">
@@ -21707,7 +21927,7 @@
         </p:nvSpPr>
         <p:spPr bwMode="gray">
           <a:xfrm>
-            <a:off x="7405254" y="5037163"/>
+            <a:off x="8120973" y="5030858"/>
             <a:ext cx="914400" cy="221672"/>
           </a:xfrm>
           <a:prstGeom prst="rect">
@@ -21759,7 +21979,7 @@
         <p:spPr bwMode="gray">
           <a:xfrm>
             <a:off x="406977" y="3816426"/>
-            <a:ext cx="6998277" cy="1477328"/>
+            <a:ext cx="7529008" cy="1477328"/>
           </a:xfrm>
           <a:prstGeom prst="rect">
             <a:avLst/>
@@ -21780,19 +22000,19 @@
           <a:p>
             <a:r>
               <a:rPr lang="en-US" dirty="0"/>
-              <a:t>Premise-1: Robots follow the Asimov laws which prioritize the safety of humans</a:t>
+              <a:t>Premise-1: All robots follow the Asimov laws which prioritize the safety of humans</a:t>
             </a:r>
           </a:p>
           <a:p>
             <a:r>
               <a:rPr lang="en-US" dirty="0"/>
-              <a:t>Premise-2: Autonomous weapons are robots</a:t>
+              <a:t>Premise-2: All autonomous weapons are robots</a:t>
             </a:r>
           </a:p>
           <a:p>
             <a:r>
               <a:rPr lang="en-US" dirty="0"/>
-              <a:t>Conclusion: Autonomous weapons are safe</a:t>
+              <a:t>Conclusion: All autonomous weapons are safe</a:t>
             </a:r>
           </a:p>
         </p:txBody>
@@ -21811,7 +22031,7 @@
         </p:nvSpPr>
         <p:spPr bwMode="gray">
           <a:xfrm>
-            <a:off x="7405254" y="4719025"/>
+            <a:off x="8120973" y="4712720"/>
             <a:ext cx="914400" cy="221672"/>
           </a:xfrm>
           <a:prstGeom prst="rect">

</xml_diff>